<commit_message>
Updated version of presentation
</commit_message>
<xml_diff>
--- a/Presentation1.pptx
+++ b/Presentation1.pptx
@@ -6,11 +6,14 @@
   </p:sldMasterIdLst>
   <p:sldIdLst>
     <p:sldId id="256" r:id="rId2"/>
-    <p:sldId id="257" r:id="rId3"/>
-    <p:sldId id="271" r:id="rId4"/>
-    <p:sldId id="258" r:id="rId5"/>
-    <p:sldId id="260" r:id="rId6"/>
-    <p:sldId id="272" r:id="rId7"/>
+    <p:sldId id="275" r:id="rId3"/>
+    <p:sldId id="257" r:id="rId4"/>
+    <p:sldId id="271" r:id="rId5"/>
+    <p:sldId id="258" r:id="rId6"/>
+    <p:sldId id="260" r:id="rId7"/>
+    <p:sldId id="273" r:id="rId8"/>
+    <p:sldId id="274" r:id="rId9"/>
+    <p:sldId id="272" r:id="rId10"/>
   </p:sldIdLst>
   <p:sldSz cx="12192000" cy="6858000"/>
   <p:notesSz cx="6858000" cy="9144000"/>
@@ -305,7 +308,7 @@
           <a:p>
             <a:fld id="{5FDE85CD-D7B5-401C-81D5-5C6ABFBEF61D}" type="datetimeFigureOut">
               <a:rPr lang="en-US" smtClean="0"/>
-              <a:t>10/2/2023</a:t>
+              <a:t>10/17/2023</a:t>
             </a:fld>
             <a:endParaRPr lang="en-US"/>
           </a:p>
@@ -643,7 +646,7 @@
           <a:p>
             <a:fld id="{5FDE85CD-D7B5-401C-81D5-5C6ABFBEF61D}" type="datetimeFigureOut">
               <a:rPr lang="en-US" smtClean="0"/>
-              <a:t>10/2/2023</a:t>
+              <a:t>10/17/2023</a:t>
             </a:fld>
             <a:endParaRPr lang="en-US"/>
           </a:p>
@@ -1044,7 +1047,7 @@
           <a:p>
             <a:fld id="{5FDE85CD-D7B5-401C-81D5-5C6ABFBEF61D}" type="datetimeFigureOut">
               <a:rPr lang="en-US" smtClean="0"/>
-              <a:t>10/2/2023</a:t>
+              <a:t>10/17/2023</a:t>
             </a:fld>
             <a:endParaRPr lang="en-US"/>
           </a:p>
@@ -1380,7 +1383,7 @@
           <a:p>
             <a:fld id="{5FDE85CD-D7B5-401C-81D5-5C6ABFBEF61D}" type="datetimeFigureOut">
               <a:rPr lang="en-US" smtClean="0"/>
-              <a:t>10/2/2023</a:t>
+              <a:t>10/17/2023</a:t>
             </a:fld>
             <a:endParaRPr lang="en-US"/>
           </a:p>
@@ -1700,7 +1703,7 @@
           <a:p>
             <a:fld id="{5FDE85CD-D7B5-401C-81D5-5C6ABFBEF61D}" type="datetimeFigureOut">
               <a:rPr lang="en-US" smtClean="0"/>
-              <a:t>10/2/2023</a:t>
+              <a:t>10/17/2023</a:t>
             </a:fld>
             <a:endParaRPr lang="en-US"/>
           </a:p>
@@ -2096,7 +2099,7 @@
           <a:p>
             <a:fld id="{5FDE85CD-D7B5-401C-81D5-5C6ABFBEF61D}" type="datetimeFigureOut">
               <a:rPr lang="en-US" smtClean="0"/>
-              <a:t>10/2/2023</a:t>
+              <a:t>10/17/2023</a:t>
             </a:fld>
             <a:endParaRPr lang="en-US"/>
           </a:p>
@@ -2353,7 +2356,7 @@
           <a:p>
             <a:fld id="{5FDE85CD-D7B5-401C-81D5-5C6ABFBEF61D}" type="datetimeFigureOut">
               <a:rPr lang="en-US" smtClean="0"/>
-              <a:t>10/2/2023</a:t>
+              <a:t>10/17/2023</a:t>
             </a:fld>
             <a:endParaRPr lang="en-US"/>
           </a:p>
@@ -2615,7 +2618,7 @@
           <a:p>
             <a:fld id="{5FDE85CD-D7B5-401C-81D5-5C6ABFBEF61D}" type="datetimeFigureOut">
               <a:rPr lang="en-US" smtClean="0"/>
-              <a:t>10/2/2023</a:t>
+              <a:t>10/17/2023</a:t>
             </a:fld>
             <a:endParaRPr lang="en-US"/>
           </a:p>
@@ -2877,7 +2880,7 @@
           <a:p>
             <a:fld id="{5FDE85CD-D7B5-401C-81D5-5C6ABFBEF61D}" type="datetimeFigureOut">
               <a:rPr lang="en-US" smtClean="0"/>
-              <a:t>10/2/2023</a:t>
+              <a:t>10/17/2023</a:t>
             </a:fld>
             <a:endParaRPr lang="en-US"/>
           </a:p>
@@ -3206,7 +3209,7 @@
           <a:p>
             <a:fld id="{5FDE85CD-D7B5-401C-81D5-5C6ABFBEF61D}" type="datetimeFigureOut">
               <a:rPr lang="en-US" smtClean="0"/>
-              <a:t>10/2/2023</a:t>
+              <a:t>10/17/2023</a:t>
             </a:fld>
             <a:endParaRPr lang="en-US"/>
           </a:p>
@@ -3529,7 +3532,7 @@
           <a:p>
             <a:fld id="{5FDE85CD-D7B5-401C-81D5-5C6ABFBEF61D}" type="datetimeFigureOut">
               <a:rPr lang="en-US" smtClean="0"/>
-              <a:t>10/2/2023</a:t>
+              <a:t>10/17/2023</a:t>
             </a:fld>
             <a:endParaRPr lang="en-US"/>
           </a:p>
@@ -3986,7 +3989,7 @@
           <a:p>
             <a:fld id="{5FDE85CD-D7B5-401C-81D5-5C6ABFBEF61D}" type="datetimeFigureOut">
               <a:rPr lang="en-US" smtClean="0"/>
-              <a:t>10/2/2023</a:t>
+              <a:t>10/17/2023</a:t>
             </a:fld>
             <a:endParaRPr lang="en-US"/>
           </a:p>
@@ -4191,7 +4194,7 @@
           <a:p>
             <a:fld id="{5FDE85CD-D7B5-401C-81D5-5C6ABFBEF61D}" type="datetimeFigureOut">
               <a:rPr lang="en-US" smtClean="0"/>
-              <a:t>10/2/2023</a:t>
+              <a:t>10/17/2023</a:t>
             </a:fld>
             <a:endParaRPr lang="en-US"/>
           </a:p>
@@ -4368,7 +4371,7 @@
           <a:p>
             <a:fld id="{5FDE85CD-D7B5-401C-81D5-5C6ABFBEF61D}" type="datetimeFigureOut">
               <a:rPr lang="en-US" smtClean="0"/>
-              <a:t>10/2/2023</a:t>
+              <a:t>10/17/2023</a:t>
             </a:fld>
             <a:endParaRPr lang="en-US"/>
           </a:p>
@@ -4701,7 +4704,7 @@
           <a:p>
             <a:fld id="{5FDE85CD-D7B5-401C-81D5-5C6ABFBEF61D}" type="datetimeFigureOut">
               <a:rPr lang="en-US" smtClean="0"/>
-              <a:t>10/2/2023</a:t>
+              <a:t>10/17/2023</a:t>
             </a:fld>
             <a:endParaRPr lang="en-US"/>
           </a:p>
@@ -5046,7 +5049,7 @@
           <a:p>
             <a:fld id="{5FDE85CD-D7B5-401C-81D5-5C6ABFBEF61D}" type="datetimeFigureOut">
               <a:rPr lang="en-US" smtClean="0"/>
-              <a:t>10/2/2023</a:t>
+              <a:t>10/17/2023</a:t>
             </a:fld>
             <a:endParaRPr lang="en-US"/>
           </a:p>
@@ -7163,7 +7166,7 @@
           <a:p>
             <a:fld id="{5FDE85CD-D7B5-401C-81D5-5C6ABFBEF61D}" type="datetimeFigureOut">
               <a:rPr lang="en-US" smtClean="0"/>
-              <a:t>10/2/2023</a:t>
+              <a:t>10/17/2023</a:t>
             </a:fld>
             <a:endParaRPr lang="en-US"/>
           </a:p>
@@ -7763,7 +7766,29 @@
                 <a:latin typeface="Times New Roman" panose="02020603050405020304" pitchFamily="18" charset="0"/>
                 <a:ea typeface="Times New Roman" panose="02020603050405020304" pitchFamily="18" charset="0"/>
               </a:rPr>
-              <a:t>Face Recognition System</a:t>
+              <a:t>Face Recognition </a:t>
+            </a:r>
+            <a:r>
+              <a:rPr lang="en-US" sz="2000" b="1" dirty="0" err="1">
+                <a:solidFill>
+                  <a:srgbClr val="4472C4"/>
+                </a:solidFill>
+                <a:effectLst/>
+                <a:latin typeface="Times New Roman" panose="02020603050405020304" pitchFamily="18" charset="0"/>
+                <a:ea typeface="Times New Roman" panose="02020603050405020304" pitchFamily="18" charset="0"/>
+              </a:rPr>
+              <a:t>Attendence</a:t>
+            </a:r>
+            <a:r>
+              <a:rPr lang="en-US" sz="2000" b="1" dirty="0">
+                <a:solidFill>
+                  <a:srgbClr val="4472C4"/>
+                </a:solidFill>
+                <a:effectLst/>
+                <a:latin typeface="Times New Roman" panose="02020603050405020304" pitchFamily="18" charset="0"/>
+                <a:ea typeface="Times New Roman" panose="02020603050405020304" pitchFamily="18" charset="0"/>
+              </a:rPr>
+              <a:t> System</a:t>
             </a:r>
             <a:endParaRPr lang="en-US" sz="2000" b="1" dirty="0">
               <a:effectLst/>
@@ -7956,6 +7981,168 @@
         </p:spPr>
         <p:txBody>
           <a:bodyPr>
+            <a:normAutofit/>
+          </a:bodyPr>
+          <a:lstStyle/>
+          <a:p>
+            <a:pPr marL="0" marR="0"/>
+            <a:r>
+              <a:rPr lang="en-US" sz="4800" b="1" dirty="0">
+                <a:effectLst/>
+                <a:latin typeface="Times New Roman" panose="02020603050405020304" pitchFamily="18" charset="0"/>
+                <a:ea typeface="Times New Roman" panose="02020603050405020304" pitchFamily="18" charset="0"/>
+              </a:rPr>
+              <a:t>Why we choose this project?</a:t>
+            </a:r>
+          </a:p>
+        </p:txBody>
+      </p:sp>
+      <p:sp>
+        <p:nvSpPr>
+          <p:cNvPr id="3" name="Subtitle 2">
+            <a:extLst>
+              <a:ext uri="{FF2B5EF4-FFF2-40B4-BE49-F238E27FC236}">
+                <a16:creationId xmlns:a16="http://schemas.microsoft.com/office/drawing/2014/main" id="{E1F72A2A-D393-F72E-9F4A-B546B7D853AA}"/>
+              </a:ext>
+            </a:extLst>
+          </p:cNvPr>
+          <p:cNvSpPr>
+            <a:spLocks noGrp="1"/>
+          </p:cNvSpPr>
+          <p:nvPr>
+            <p:ph type="subTitle" idx="1"/>
+          </p:nvPr>
+        </p:nvSpPr>
+        <p:spPr>
+          <a:xfrm>
+            <a:off x="1714500" y="3194844"/>
+            <a:ext cx="10239375" cy="3417093"/>
+          </a:xfrm>
+        </p:spPr>
+        <p:txBody>
+          <a:bodyPr>
+            <a:normAutofit fontScale="70000" lnSpcReduction="20000"/>
+          </a:bodyPr>
+          <a:lstStyle/>
+          <a:p>
+            <a:pPr marR="0" lvl="0" algn="just"/>
+            <a:r>
+              <a:rPr lang="en-US" sz="3600" dirty="0">
+                <a:effectLst/>
+                <a:latin typeface="Times New Roman" panose="02020603050405020304" pitchFamily="18" charset="0"/>
+                <a:ea typeface="Times New Roman" panose="02020603050405020304" pitchFamily="18" charset="0"/>
+              </a:rPr>
+              <a:t>We decided to create a Face Recognition Attendance System because it's a smart way to take attendance. This project uses modern technology to make our university life easier. It will help us know who's present in class without needing to sign our names, and it also adds a bit of extra safety. Plus, we can learn a lot about computers and technology while doing this, and it's a cool and new idea that can make our university look good. In the time of COVID-19, it's also a safe way to do things without touching. So, we chose this project because it's a smart, safe, and modern way to take attendance while also helping us learn new things.</a:t>
+            </a:r>
+            <a:endParaRPr lang="en-US" sz="2000" dirty="0">
+              <a:effectLst/>
+              <a:latin typeface="Times New Roman" panose="02020603050405020304" pitchFamily="18" charset="0"/>
+              <a:ea typeface="Times New Roman" panose="02020603050405020304" pitchFamily="18" charset="0"/>
+            </a:endParaRPr>
+          </a:p>
+        </p:txBody>
+      </p:sp>
+      <p:pic>
+        <p:nvPicPr>
+          <p:cNvPr id="1028" name="Picture 4" descr="Face Recognition Images | Free Photos, PNG Stickers ...">
+            <a:extLst>
+              <a:ext uri="{FF2B5EF4-FFF2-40B4-BE49-F238E27FC236}">
+                <a16:creationId xmlns:a16="http://schemas.microsoft.com/office/drawing/2014/main" id="{21A520E2-D567-3C52-7C0F-72F60B233F2F}"/>
+              </a:ext>
+            </a:extLst>
+          </p:cNvPr>
+          <p:cNvPicPr>
+            <a:picLocks noChangeAspect="1" noChangeArrowheads="1"/>
+          </p:cNvPicPr>
+          <p:nvPr/>
+        </p:nvPicPr>
+        <p:blipFill>
+          <a:blip r:embed="rId2">
+            <a:extLst>
+              <a:ext uri="{28A0092B-C50C-407E-A947-70E740481C1C}">
+                <a14:useLocalDpi xmlns:a14="http://schemas.microsoft.com/office/drawing/2010/main" val="0"/>
+              </a:ext>
+            </a:extLst>
+          </a:blip>
+          <a:srcRect/>
+          <a:stretch>
+            <a:fillRect/>
+          </a:stretch>
+        </p:blipFill>
+        <p:spPr bwMode="auto">
+          <a:xfrm>
+            <a:off x="8762999" y="838994"/>
+            <a:ext cx="1847850" cy="1847850"/>
+          </a:xfrm>
+          <a:prstGeom prst="rect">
+            <a:avLst/>
+          </a:prstGeom>
+          <a:noFill/>
+          <a:extLst>
+            <a:ext uri="{909E8E84-426E-40DD-AFC4-6F175D3DCCD1}">
+              <a14:hiddenFill xmlns:a14="http://schemas.microsoft.com/office/drawing/2010/main">
+                <a:solidFill>
+                  <a:srgbClr val="FFFFFF"/>
+                </a:solidFill>
+              </a14:hiddenFill>
+            </a:ext>
+          </a:extLst>
+        </p:spPr>
+      </p:pic>
+    </p:spTree>
+    <p:extLst>
+      <p:ext uri="{BB962C8B-B14F-4D97-AF65-F5344CB8AC3E}">
+        <p14:creationId xmlns:p14="http://schemas.microsoft.com/office/powerpoint/2010/main" val="516223984"/>
+      </p:ext>
+    </p:extLst>
+  </p:cSld>
+  <p:clrMapOvr>
+    <a:masterClrMapping/>
+  </p:clrMapOvr>
+</p:sld>
+</file>
+
+<file path=ppt/slides/slide3.xml><?xml version="1.0" encoding="utf-8"?>
+<p:sld xmlns:a="http://schemas.openxmlformats.org/drawingml/2006/main" xmlns:r="http://schemas.openxmlformats.org/officeDocument/2006/relationships" xmlns:p="http://schemas.openxmlformats.org/presentationml/2006/main">
+  <p:cSld>
+    <p:spTree>
+      <p:nvGrpSpPr>
+        <p:cNvPr id="1" name=""/>
+        <p:cNvGrpSpPr/>
+        <p:nvPr/>
+      </p:nvGrpSpPr>
+      <p:grpSpPr>
+        <a:xfrm>
+          <a:off x="0" y="0"/>
+          <a:ext cx="0" cy="0"/>
+          <a:chOff x="0" y="0"/>
+          <a:chExt cx="0" cy="0"/>
+        </a:xfrm>
+      </p:grpSpPr>
+      <p:sp>
+        <p:nvSpPr>
+          <p:cNvPr id="2" name="Title 1">
+            <a:extLst>
+              <a:ext uri="{FF2B5EF4-FFF2-40B4-BE49-F238E27FC236}">
+                <a16:creationId xmlns:a16="http://schemas.microsoft.com/office/drawing/2014/main" id="{8074EC7F-823D-A69E-D8C7-2E81BB9EC9B9}"/>
+              </a:ext>
+            </a:extLst>
+          </p:cNvPr>
+          <p:cNvSpPr>
+            <a:spLocks noGrp="1"/>
+          </p:cNvSpPr>
+          <p:nvPr>
+            <p:ph type="ctrTitle"/>
+          </p:nvPr>
+        </p:nvSpPr>
+        <p:spPr>
+          <a:xfrm>
+            <a:off x="371474" y="246063"/>
+            <a:ext cx="10239375" cy="887412"/>
+          </a:xfrm>
+        </p:spPr>
+        <p:txBody>
+          <a:bodyPr>
             <a:normAutofit fontScale="90000"/>
           </a:bodyPr>
           <a:lstStyle/>
@@ -8106,7 +8293,7 @@
 </p:sld>
 </file>
 
-<file path=ppt/slides/slide3.xml><?xml version="1.0" encoding="utf-8"?>
+<file path=ppt/slides/slide4.xml><?xml version="1.0" encoding="utf-8"?>
 <p:sld xmlns:a="http://schemas.openxmlformats.org/drawingml/2006/main" xmlns:r="http://schemas.openxmlformats.org/officeDocument/2006/relationships" xmlns:p="http://schemas.openxmlformats.org/presentationml/2006/main">
   <p:cSld>
     <p:spTree>
@@ -8188,18 +8375,92 @@
         </p:spPr>
         <p:txBody>
           <a:bodyPr>
-            <a:normAutofit fontScale="92500" lnSpcReduction="10000"/>
+            <a:normAutofit fontScale="62500" lnSpcReduction="20000"/>
           </a:bodyPr>
           <a:lstStyle/>
           <a:p>
-            <a:pPr marL="0" marR="0" algn="just"/>
+            <a:pPr>
+              <a:buFont typeface="Wingdings" panose="05000000000000000000" pitchFamily="2" charset="2"/>
+              <a:buChar char="Ø"/>
+            </a:pPr>
+            <a:r>
+              <a:rPr lang="en-US" sz="3600">
+                <a:latin typeface="Times New Roman" panose="02020603050405020304" pitchFamily="18" charset="0"/>
+                <a:cs typeface="Times New Roman" panose="02020603050405020304" pitchFamily="18" charset="0"/>
+              </a:rPr>
+              <a:t>The </a:t>
+            </a:r>
             <a:r>
               <a:rPr lang="en-US" sz="3600" dirty="0">
-                <a:effectLst/>
                 <a:latin typeface="Times New Roman" panose="02020603050405020304" pitchFamily="18" charset="0"/>
-                <a:ea typeface="Times New Roman" panose="02020603050405020304" pitchFamily="18" charset="0"/>
+                <a:cs typeface="Times New Roman" panose="02020603050405020304" pitchFamily="18" charset="0"/>
               </a:rPr>
-              <a:t>Traditional methods of attendance tracking, access control, and security in educational institutions are often inefficient, time-consuming, and prone to errors. The lack of a centralized system for identity verification and access control can lead to security breaches and challenges in administrative tasks.</a:t>
+              <a:t>old system of keeping records in Attendance management system. On which records are kept in a paper file by hand. There were many problems such as :-</a:t>
+            </a:r>
+          </a:p>
+          <a:p>
+            <a:pPr lvl="0">
+              <a:buFont typeface="Wingdings" panose="05000000000000000000" pitchFamily="2" charset="2"/>
+              <a:buChar char="Ø"/>
+            </a:pPr>
+            <a:r>
+              <a:rPr lang="en-US" sz="3600" dirty="0">
+                <a:latin typeface="Times New Roman" panose="02020603050405020304" pitchFamily="18" charset="0"/>
+                <a:cs typeface="Times New Roman" panose="02020603050405020304" pitchFamily="18" charset="0"/>
+              </a:rPr>
+              <a:t> Lack of security</a:t>
+            </a:r>
+          </a:p>
+          <a:p>
+            <a:pPr lvl="0">
+              <a:buFont typeface="Wingdings" panose="05000000000000000000" pitchFamily="2" charset="2"/>
+              <a:buChar char="Ø"/>
+            </a:pPr>
+            <a:r>
+              <a:rPr lang="en-US" sz="3600" dirty="0">
+                <a:latin typeface="Times New Roman" panose="02020603050405020304" pitchFamily="18" charset="0"/>
+                <a:cs typeface="Times New Roman" panose="02020603050405020304" pitchFamily="18" charset="0"/>
+              </a:rPr>
+              <a:t>Time consuming</a:t>
+            </a:r>
+          </a:p>
+          <a:p>
+            <a:pPr lvl="0">
+              <a:buFont typeface="Wingdings" panose="05000000000000000000" pitchFamily="2" charset="2"/>
+              <a:buChar char="Ø"/>
+            </a:pPr>
+            <a:r>
+              <a:rPr lang="en-US" sz="3600" dirty="0">
+                <a:latin typeface="Times New Roman" panose="02020603050405020304" pitchFamily="18" charset="0"/>
+                <a:cs typeface="Times New Roman" panose="02020603050405020304" pitchFamily="18" charset="0"/>
+              </a:rPr>
+              <a:t>Consumes large volume of paperwork.</a:t>
+            </a:r>
+          </a:p>
+          <a:p>
+            <a:pPr lvl="0">
+              <a:buFont typeface="Wingdings" panose="05000000000000000000" pitchFamily="2" charset="2"/>
+              <a:buChar char="Ø"/>
+            </a:pPr>
+            <a:r>
+              <a:rPr lang="en-US" sz="3600" dirty="0">
+                <a:latin typeface="Times New Roman" panose="02020603050405020304" pitchFamily="18" charset="0"/>
+                <a:cs typeface="Times New Roman" panose="02020603050405020304" pitchFamily="18" charset="0"/>
+              </a:rPr>
+              <a:t>lack of storage.</a:t>
+            </a:r>
+          </a:p>
+          <a:p>
+            <a:pPr lvl="0">
+              <a:buFont typeface="Wingdings" panose="05000000000000000000" pitchFamily="2" charset="2"/>
+              <a:buChar char="Ø"/>
+            </a:pPr>
+            <a:r>
+              <a:rPr lang="en-US" sz="3600" dirty="0">
+                <a:latin typeface="Times New Roman" panose="02020603050405020304" pitchFamily="18" charset="0"/>
+                <a:cs typeface="Times New Roman" panose="02020603050405020304" pitchFamily="18" charset="0"/>
+              </a:rPr>
+              <a:t>Difficulty in data searching</a:t>
             </a:r>
           </a:p>
         </p:txBody>
@@ -8264,7 +8525,7 @@
 </p:sld>
 </file>
 
-<file path=ppt/slides/slide4.xml><?xml version="1.0" encoding="utf-8"?>
+<file path=ppt/slides/slide5.xml><?xml version="1.0" encoding="utf-8"?>
 <p:sld xmlns:a="http://schemas.openxmlformats.org/drawingml/2006/main" xmlns:r="http://schemas.openxmlformats.org/officeDocument/2006/relationships" xmlns:p="http://schemas.openxmlformats.org/presentationml/2006/main">
   <p:cSld>
     <p:spTree>
@@ -8547,7 +8808,7 @@
 </p:sld>
 </file>
 
-<file path=ppt/slides/slide5.xml><?xml version="1.0" encoding="utf-8"?>
+<file path=ppt/slides/slide6.xml><?xml version="1.0" encoding="utf-8"?>
 <p:sld xmlns:a="http://schemas.openxmlformats.org/drawingml/2006/main" xmlns:r="http://schemas.openxmlformats.org/officeDocument/2006/relationships" xmlns:p="http://schemas.openxmlformats.org/presentationml/2006/main">
   <p:cSld>
     <p:spTree>
@@ -8652,7 +8913,7 @@
                 <a:ea typeface="Calibri" panose="020F0502020204030204" pitchFamily="34" charset="0"/>
                 <a:cs typeface="Times New Roman" panose="02020603050405020304" pitchFamily="18" charset="0"/>
               </a:rPr>
-              <a:t> Mark attendance by recognizing faces in real-time</a:t>
+              <a:t>Mark attendance by recognizing faces in real-time</a:t>
             </a:r>
           </a:p>
           <a:p>
@@ -8676,7 +8937,7 @@
                 <a:ea typeface="Calibri" panose="020F0502020204030204" pitchFamily="34" charset="0"/>
                 <a:cs typeface="Times New Roman" panose="02020603050405020304" pitchFamily="18" charset="0"/>
               </a:rPr>
-              <a:t> Register new users by uploading their images</a:t>
+              <a:t>Register new users by uploading their images</a:t>
             </a:r>
           </a:p>
           <a:p>
@@ -8700,7 +8961,7 @@
                 <a:ea typeface="Calibri" panose="020F0502020204030204" pitchFamily="34" charset="0"/>
                 <a:cs typeface="Times New Roman" panose="02020603050405020304" pitchFamily="18" charset="0"/>
               </a:rPr>
-              <a:t> View the attendance sheet with date and time details</a:t>
+              <a:t>View the attendance sheet with date and time details</a:t>
             </a:r>
           </a:p>
           <a:p>
@@ -8724,7 +8985,7 @@
                 <a:ea typeface="Calibri" panose="020F0502020204030204" pitchFamily="34" charset="0"/>
                 <a:cs typeface="Times New Roman" panose="02020603050405020304" pitchFamily="18" charset="0"/>
               </a:rPr>
-              <a:t> User-friendly simple interface </a:t>
+              <a:t>User-friendly simple interface </a:t>
             </a:r>
           </a:p>
           <a:p>
@@ -8748,7 +9009,7 @@
                 <a:ea typeface="Calibri" panose="020F0502020204030204" pitchFamily="34" charset="0"/>
                 <a:cs typeface="Times New Roman" panose="02020603050405020304" pitchFamily="18" charset="0"/>
               </a:rPr>
-              <a:t> Easy setup and usage </a:t>
+              <a:t>Easy setup and usage </a:t>
             </a:r>
           </a:p>
           <a:p>
@@ -8853,7 +9114,489 @@
 </p:sld>
 </file>
 
-<file path=ppt/slides/slide6.xml><?xml version="1.0" encoding="utf-8"?>
+<file path=ppt/slides/slide7.xml><?xml version="1.0" encoding="utf-8"?>
+<p:sld xmlns:a="http://schemas.openxmlformats.org/drawingml/2006/main" xmlns:r="http://schemas.openxmlformats.org/officeDocument/2006/relationships" xmlns:p="http://schemas.openxmlformats.org/presentationml/2006/main">
+  <p:cSld>
+    <p:spTree>
+      <p:nvGrpSpPr>
+        <p:cNvPr id="1" name=""/>
+        <p:cNvGrpSpPr/>
+        <p:nvPr/>
+      </p:nvGrpSpPr>
+      <p:grpSpPr>
+        <a:xfrm>
+          <a:off x="0" y="0"/>
+          <a:ext cx="0" cy="0"/>
+          <a:chOff x="0" y="0"/>
+          <a:chExt cx="0" cy="0"/>
+        </a:xfrm>
+      </p:grpSpPr>
+      <p:sp>
+        <p:nvSpPr>
+          <p:cNvPr id="4" name="Title 1">
+            <a:extLst>
+              <a:ext uri="{FF2B5EF4-FFF2-40B4-BE49-F238E27FC236}">
+                <a16:creationId xmlns:a16="http://schemas.microsoft.com/office/drawing/2014/main" id="{53675CA2-64DC-7C59-EBE2-3666F185D901}"/>
+              </a:ext>
+            </a:extLst>
+          </p:cNvPr>
+          <p:cNvSpPr>
+            <a:spLocks noGrp="1"/>
+          </p:cNvSpPr>
+          <p:nvPr>
+            <p:ph type="ctrTitle"/>
+          </p:nvPr>
+        </p:nvSpPr>
+        <p:spPr>
+          <a:xfrm>
+            <a:off x="552449" y="569913"/>
+            <a:ext cx="3505201" cy="887412"/>
+          </a:xfrm>
+        </p:spPr>
+        <p:txBody>
+          <a:bodyPr>
+            <a:normAutofit fontScale="90000"/>
+          </a:bodyPr>
+          <a:lstStyle/>
+          <a:p>
+            <a:r>
+              <a:rPr lang="en-US" sz="5300" b="1" dirty="0">
+                <a:latin typeface="Calibri" panose="020F0502020204030204" pitchFamily="34" charset="0"/>
+                <a:ea typeface="Calibri" panose="020F0502020204030204" pitchFamily="34" charset="0"/>
+                <a:cs typeface="Times New Roman" panose="02020603050405020304" pitchFamily="18" charset="0"/>
+              </a:rPr>
+              <a:t>Benchmark:</a:t>
+            </a:r>
+            <a:endParaRPr lang="en-US" sz="46900" b="1" dirty="0"/>
+          </a:p>
+        </p:txBody>
+      </p:sp>
+      <p:sp>
+        <p:nvSpPr>
+          <p:cNvPr id="6" name="Subtitle 2">
+            <a:extLst>
+              <a:ext uri="{FF2B5EF4-FFF2-40B4-BE49-F238E27FC236}">
+                <a16:creationId xmlns:a16="http://schemas.microsoft.com/office/drawing/2014/main" id="{547B36C9-E120-B043-4FC8-4681CE7DC1A4}"/>
+              </a:ext>
+            </a:extLst>
+          </p:cNvPr>
+          <p:cNvSpPr>
+            <a:spLocks noGrp="1"/>
+          </p:cNvSpPr>
+          <p:nvPr>
+            <p:ph type="subTitle" idx="1"/>
+          </p:nvPr>
+        </p:nvSpPr>
+        <p:spPr>
+          <a:xfrm>
+            <a:off x="1921933" y="2466273"/>
+            <a:ext cx="7577667" cy="3906573"/>
+          </a:xfrm>
+        </p:spPr>
+        <p:txBody>
+          <a:bodyPr>
+            <a:normAutofit/>
+          </a:bodyPr>
+          <a:lstStyle/>
+          <a:p>
+            <a:pPr algn="l"/>
+            <a:r>
+              <a:rPr lang="en-US" sz="3200" b="1" dirty="0">
+                <a:latin typeface="Söhne"/>
+              </a:rPr>
+              <a:t>1</a:t>
+            </a:r>
+            <a:r>
+              <a:rPr lang="en-US" sz="3200" b="1" i="0" dirty="0">
+                <a:effectLst/>
+                <a:latin typeface="Söhne"/>
+              </a:rPr>
+              <a:t>.</a:t>
+            </a:r>
+            <a:r>
+              <a:rPr lang="en-US" sz="2800" b="1" i="0" dirty="0">
+                <a:effectLst/>
+                <a:latin typeface="Söhne"/>
+              </a:rPr>
+              <a:t>Security:</a:t>
+            </a:r>
+            <a:endParaRPr lang="en-US" sz="3200" b="1" i="0" dirty="0">
+              <a:effectLst/>
+              <a:latin typeface="Söhne"/>
+            </a:endParaRPr>
+          </a:p>
+          <a:p>
+            <a:pPr>
+              <a:lnSpc>
+                <a:spcPct val="107000"/>
+              </a:lnSpc>
+              <a:spcBef>
+                <a:spcPts val="0"/>
+              </a:spcBef>
+            </a:pPr>
+            <a:r>
+              <a:rPr lang="en-US" sz="3200" b="1" dirty="0">
+                <a:latin typeface="Calibri" panose="020F0502020204030204" pitchFamily="34" charset="0"/>
+                <a:ea typeface="Calibri" panose="020F0502020204030204" pitchFamily="34" charset="0"/>
+                <a:cs typeface="Times New Roman" panose="02020603050405020304" pitchFamily="18" charset="0"/>
+              </a:rPr>
+              <a:t>2.</a:t>
+            </a:r>
+            <a:r>
+              <a:rPr lang="en-US" sz="2800" b="1" i="0" dirty="0">
+                <a:effectLst/>
+                <a:latin typeface="Söhne"/>
+              </a:rPr>
+              <a:t>User Experience:</a:t>
+            </a:r>
+            <a:endParaRPr lang="en-US" sz="3200" b="1" dirty="0">
+              <a:latin typeface="Calibri" panose="020F0502020204030204" pitchFamily="34" charset="0"/>
+              <a:ea typeface="Calibri" panose="020F0502020204030204" pitchFamily="34" charset="0"/>
+              <a:cs typeface="Times New Roman" panose="02020603050405020304" pitchFamily="18" charset="0"/>
+            </a:endParaRPr>
+          </a:p>
+          <a:p>
+            <a:pPr marR="0" lvl="0">
+              <a:lnSpc>
+                <a:spcPct val="107000"/>
+              </a:lnSpc>
+              <a:spcBef>
+                <a:spcPts val="0"/>
+              </a:spcBef>
+              <a:spcAft>
+                <a:spcPts val="0"/>
+              </a:spcAft>
+            </a:pPr>
+            <a:r>
+              <a:rPr lang="en-US" sz="3200" b="1" dirty="0">
+                <a:effectLst/>
+                <a:latin typeface="Calibri" panose="020F0502020204030204" pitchFamily="34" charset="0"/>
+                <a:ea typeface="Calibri" panose="020F0502020204030204" pitchFamily="34" charset="0"/>
+                <a:cs typeface="Times New Roman" panose="02020603050405020304" pitchFamily="18" charset="0"/>
+              </a:rPr>
+              <a:t>3.</a:t>
+            </a:r>
+            <a:r>
+              <a:rPr lang="en-US" sz="2800" b="1" dirty="0">
+                <a:latin typeface="Calibri" panose="020F0502020204030204" pitchFamily="34" charset="0"/>
+                <a:ea typeface="Calibri" panose="020F0502020204030204" pitchFamily="34" charset="0"/>
+                <a:cs typeface="Times New Roman" panose="02020603050405020304" pitchFamily="18" charset="0"/>
+              </a:rPr>
+              <a:t>Accuracy:</a:t>
+            </a:r>
+            <a:endParaRPr lang="en-US" sz="2800" b="1" dirty="0">
+              <a:effectLst/>
+              <a:latin typeface="Calibri" panose="020F0502020204030204" pitchFamily="34" charset="0"/>
+              <a:ea typeface="Calibri" panose="020F0502020204030204" pitchFamily="34" charset="0"/>
+              <a:cs typeface="Times New Roman" panose="02020603050405020304" pitchFamily="18" charset="0"/>
+            </a:endParaRPr>
+          </a:p>
+          <a:p>
+            <a:pPr marR="0" lvl="0">
+              <a:lnSpc>
+                <a:spcPct val="107000"/>
+              </a:lnSpc>
+              <a:spcBef>
+                <a:spcPts val="0"/>
+              </a:spcBef>
+              <a:spcAft>
+                <a:spcPts val="0"/>
+              </a:spcAft>
+            </a:pPr>
+            <a:r>
+              <a:rPr lang="en-US" sz="3200" b="1" dirty="0">
+                <a:latin typeface="Calibri" panose="020F0502020204030204" pitchFamily="34" charset="0"/>
+                <a:ea typeface="Calibri" panose="020F0502020204030204" pitchFamily="34" charset="0"/>
+                <a:cs typeface="Times New Roman" panose="02020603050405020304" pitchFamily="18" charset="0"/>
+              </a:rPr>
+              <a:t>4.</a:t>
+            </a:r>
+            <a:r>
+              <a:rPr lang="en-US" sz="2800" b="1" dirty="0">
+                <a:latin typeface="Calibri" panose="020F0502020204030204" pitchFamily="34" charset="0"/>
+                <a:ea typeface="Calibri" panose="020F0502020204030204" pitchFamily="34" charset="0"/>
+                <a:cs typeface="Times New Roman" panose="02020603050405020304" pitchFamily="18" charset="0"/>
+              </a:rPr>
+              <a:t>Efficiency:</a:t>
+            </a:r>
+          </a:p>
+          <a:p>
+            <a:pPr>
+              <a:lnSpc>
+                <a:spcPct val="107000"/>
+              </a:lnSpc>
+              <a:spcBef>
+                <a:spcPts val="0"/>
+              </a:spcBef>
+            </a:pPr>
+            <a:r>
+              <a:rPr lang="en-US" sz="3200" b="1" dirty="0">
+                <a:effectLst/>
+                <a:latin typeface="Calibri" panose="020F0502020204030204" pitchFamily="34" charset="0"/>
+                <a:ea typeface="Calibri" panose="020F0502020204030204" pitchFamily="34" charset="0"/>
+                <a:cs typeface="Times New Roman" panose="02020603050405020304" pitchFamily="18" charset="0"/>
+              </a:rPr>
+              <a:t>5.</a:t>
+            </a:r>
+            <a:r>
+              <a:rPr lang="en-US" sz="2800" b="1" dirty="0">
+                <a:latin typeface="Times New Roman" panose="02020603050405020304" pitchFamily="18" charset="0"/>
+                <a:cs typeface="Times New Roman" panose="02020603050405020304" pitchFamily="18" charset="0"/>
+              </a:rPr>
+              <a:t>Data consistency</a:t>
+            </a:r>
+          </a:p>
+          <a:p>
+            <a:pPr marR="0" lvl="0">
+              <a:lnSpc>
+                <a:spcPct val="107000"/>
+              </a:lnSpc>
+              <a:spcBef>
+                <a:spcPts val="0"/>
+              </a:spcBef>
+              <a:spcAft>
+                <a:spcPts val="0"/>
+              </a:spcAft>
+            </a:pPr>
+            <a:endParaRPr lang="en-US" sz="3200" b="1" dirty="0">
+              <a:effectLst/>
+              <a:latin typeface="Calibri" panose="020F0502020204030204" pitchFamily="34" charset="0"/>
+              <a:ea typeface="Calibri" panose="020F0502020204030204" pitchFamily="34" charset="0"/>
+              <a:cs typeface="Times New Roman" panose="02020603050405020304" pitchFamily="18" charset="0"/>
+            </a:endParaRPr>
+          </a:p>
+        </p:txBody>
+      </p:sp>
+      <p:pic>
+        <p:nvPicPr>
+          <p:cNvPr id="5122" name="Picture 2" descr="Features PNG Transparent Images Free Download | Vector Files ...">
+            <a:extLst>
+              <a:ext uri="{FF2B5EF4-FFF2-40B4-BE49-F238E27FC236}">
+                <a16:creationId xmlns:a16="http://schemas.microsoft.com/office/drawing/2014/main" id="{57CC5A9C-5A0C-D194-4D08-7B0AA5FD5F68}"/>
+              </a:ext>
+            </a:extLst>
+          </p:cNvPr>
+          <p:cNvPicPr>
+            <a:picLocks noChangeAspect="1" noChangeArrowheads="1"/>
+          </p:cNvPicPr>
+          <p:nvPr/>
+        </p:nvPicPr>
+        <p:blipFill>
+          <a:blip r:embed="rId2">
+            <a:extLst>
+              <a:ext uri="{28A0092B-C50C-407E-A947-70E740481C1C}">
+                <a14:useLocalDpi xmlns:a14="http://schemas.microsoft.com/office/drawing/2010/main" val="0"/>
+              </a:ext>
+            </a:extLst>
+          </a:blip>
+          <a:srcRect/>
+          <a:stretch>
+            <a:fillRect/>
+          </a:stretch>
+        </p:blipFill>
+        <p:spPr bwMode="auto">
+          <a:xfrm>
+            <a:off x="9133648" y="485154"/>
+            <a:ext cx="2357437" cy="2357437"/>
+          </a:xfrm>
+          <a:prstGeom prst="rect">
+            <a:avLst/>
+          </a:prstGeom>
+          <a:noFill/>
+          <a:extLst>
+            <a:ext uri="{909E8E84-426E-40DD-AFC4-6F175D3DCCD1}">
+              <a14:hiddenFill xmlns:a14="http://schemas.microsoft.com/office/drawing/2010/main">
+                <a:solidFill>
+                  <a:srgbClr val="FFFFFF"/>
+                </a:solidFill>
+              </a14:hiddenFill>
+            </a:ext>
+          </a:extLst>
+        </p:spPr>
+      </p:pic>
+    </p:spTree>
+    <p:extLst>
+      <p:ext uri="{BB962C8B-B14F-4D97-AF65-F5344CB8AC3E}">
+        <p14:creationId xmlns:p14="http://schemas.microsoft.com/office/powerpoint/2010/main" val="929512220"/>
+      </p:ext>
+    </p:extLst>
+  </p:cSld>
+  <p:clrMapOvr>
+    <a:masterClrMapping/>
+  </p:clrMapOvr>
+</p:sld>
+</file>
+
+<file path=ppt/slides/slide8.xml><?xml version="1.0" encoding="utf-8"?>
+<p:sld xmlns:a="http://schemas.openxmlformats.org/drawingml/2006/main" xmlns:r="http://schemas.openxmlformats.org/officeDocument/2006/relationships" xmlns:p="http://schemas.openxmlformats.org/presentationml/2006/main">
+  <p:cSld>
+    <p:spTree>
+      <p:nvGrpSpPr>
+        <p:cNvPr id="1" name=""/>
+        <p:cNvGrpSpPr/>
+        <p:nvPr/>
+      </p:nvGrpSpPr>
+      <p:grpSpPr>
+        <a:xfrm>
+          <a:off x="0" y="0"/>
+          <a:ext cx="0" cy="0"/>
+          <a:chOff x="0" y="0"/>
+          <a:chExt cx="0" cy="0"/>
+        </a:xfrm>
+      </p:grpSpPr>
+      <p:sp>
+        <p:nvSpPr>
+          <p:cNvPr id="4" name="Title 1">
+            <a:extLst>
+              <a:ext uri="{FF2B5EF4-FFF2-40B4-BE49-F238E27FC236}">
+                <a16:creationId xmlns:a16="http://schemas.microsoft.com/office/drawing/2014/main" id="{53675CA2-64DC-7C59-EBE2-3666F185D901}"/>
+              </a:ext>
+            </a:extLst>
+          </p:cNvPr>
+          <p:cNvSpPr>
+            <a:spLocks noGrp="1"/>
+          </p:cNvSpPr>
+          <p:nvPr>
+            <p:ph type="ctrTitle"/>
+          </p:nvPr>
+        </p:nvSpPr>
+        <p:spPr>
+          <a:xfrm>
+            <a:off x="552449" y="569913"/>
+            <a:ext cx="3505201" cy="887412"/>
+          </a:xfrm>
+        </p:spPr>
+        <p:txBody>
+          <a:bodyPr>
+            <a:normAutofit fontScale="90000"/>
+          </a:bodyPr>
+          <a:lstStyle/>
+          <a:p>
+            <a:r>
+              <a:rPr lang="en-US" sz="5300" b="1" dirty="0">
+                <a:latin typeface="Calibri" panose="020F0502020204030204" pitchFamily="34" charset="0"/>
+                <a:ea typeface="Calibri" panose="020F0502020204030204" pitchFamily="34" charset="0"/>
+                <a:cs typeface="Times New Roman" panose="02020603050405020304" pitchFamily="18" charset="0"/>
+              </a:rPr>
+              <a:t>Language:</a:t>
+            </a:r>
+            <a:endParaRPr lang="en-US" sz="46900" b="1" dirty="0"/>
+          </a:p>
+        </p:txBody>
+      </p:sp>
+      <p:sp>
+        <p:nvSpPr>
+          <p:cNvPr id="6" name="Subtitle 2">
+            <a:extLst>
+              <a:ext uri="{FF2B5EF4-FFF2-40B4-BE49-F238E27FC236}">
+                <a16:creationId xmlns:a16="http://schemas.microsoft.com/office/drawing/2014/main" id="{547B36C9-E120-B043-4FC8-4681CE7DC1A4}"/>
+              </a:ext>
+            </a:extLst>
+          </p:cNvPr>
+          <p:cNvSpPr>
+            <a:spLocks noGrp="1"/>
+          </p:cNvSpPr>
+          <p:nvPr>
+            <p:ph type="subTitle" idx="1"/>
+          </p:nvPr>
+        </p:nvSpPr>
+        <p:spPr>
+          <a:xfrm>
+            <a:off x="1921934" y="4402667"/>
+            <a:ext cx="7271704" cy="1811866"/>
+          </a:xfrm>
+        </p:spPr>
+        <p:txBody>
+          <a:bodyPr>
+            <a:normAutofit/>
+          </a:bodyPr>
+          <a:lstStyle/>
+          <a:p>
+            <a:pPr marL="342900" marR="0" lvl="0" indent="-342900">
+              <a:lnSpc>
+                <a:spcPct val="107000"/>
+              </a:lnSpc>
+              <a:spcBef>
+                <a:spcPts val="0"/>
+              </a:spcBef>
+              <a:spcAft>
+                <a:spcPts val="0"/>
+              </a:spcAft>
+              <a:buFont typeface="Wingdings" panose="05000000000000000000" pitchFamily="2" charset="2"/>
+              <a:buChar char=""/>
+            </a:pPr>
+            <a:r>
+              <a:rPr lang="en-US" sz="2400" dirty="0">
+                <a:latin typeface="Calibri" panose="020F0502020204030204" pitchFamily="34" charset="0"/>
+                <a:ea typeface="Calibri" panose="020F0502020204030204" pitchFamily="34" charset="0"/>
+                <a:cs typeface="Times New Roman" panose="02020603050405020304" pitchFamily="18" charset="0"/>
+              </a:rPr>
+              <a:t>Python (complete frontend-Backend)</a:t>
+            </a:r>
+          </a:p>
+        </p:txBody>
+      </p:sp>
+      <p:pic>
+        <p:nvPicPr>
+          <p:cNvPr id="5122" name="Picture 2" descr="Features PNG Transparent Images Free Download | Vector Files ...">
+            <a:extLst>
+              <a:ext uri="{FF2B5EF4-FFF2-40B4-BE49-F238E27FC236}">
+                <a16:creationId xmlns:a16="http://schemas.microsoft.com/office/drawing/2014/main" id="{57CC5A9C-5A0C-D194-4D08-7B0AA5FD5F68}"/>
+              </a:ext>
+            </a:extLst>
+          </p:cNvPr>
+          <p:cNvPicPr>
+            <a:picLocks noChangeAspect="1" noChangeArrowheads="1"/>
+          </p:cNvPicPr>
+          <p:nvPr/>
+        </p:nvPicPr>
+        <p:blipFill>
+          <a:blip r:embed="rId2">
+            <a:extLst>
+              <a:ext uri="{28A0092B-C50C-407E-A947-70E740481C1C}">
+                <a14:useLocalDpi xmlns:a14="http://schemas.microsoft.com/office/drawing/2010/main" val="0"/>
+              </a:ext>
+            </a:extLst>
+          </a:blip>
+          <a:srcRect/>
+          <a:stretch>
+            <a:fillRect/>
+          </a:stretch>
+        </p:blipFill>
+        <p:spPr bwMode="auto">
+          <a:xfrm>
+            <a:off x="9133648" y="485154"/>
+            <a:ext cx="2357437" cy="2357437"/>
+          </a:xfrm>
+          <a:prstGeom prst="rect">
+            <a:avLst/>
+          </a:prstGeom>
+          <a:noFill/>
+          <a:extLst>
+            <a:ext uri="{909E8E84-426E-40DD-AFC4-6F175D3DCCD1}">
+              <a14:hiddenFill xmlns:a14="http://schemas.microsoft.com/office/drawing/2010/main">
+                <a:solidFill>
+                  <a:srgbClr val="FFFFFF"/>
+                </a:solidFill>
+              </a14:hiddenFill>
+            </a:ext>
+          </a:extLst>
+        </p:spPr>
+      </p:pic>
+    </p:spTree>
+    <p:extLst>
+      <p:ext uri="{BB962C8B-B14F-4D97-AF65-F5344CB8AC3E}">
+        <p14:creationId xmlns:p14="http://schemas.microsoft.com/office/powerpoint/2010/main" val="1054884610"/>
+      </p:ext>
+    </p:extLst>
+  </p:cSld>
+  <p:clrMapOvr>
+    <a:masterClrMapping/>
+  </p:clrMapOvr>
+</p:sld>
+</file>
+
+<file path=ppt/slides/slide9.xml><?xml version="1.0" encoding="utf-8"?>
 <p:sld xmlns:a="http://schemas.openxmlformats.org/drawingml/2006/main" xmlns:r="http://schemas.openxmlformats.org/officeDocument/2006/relationships" xmlns:p="http://schemas.openxmlformats.org/presentationml/2006/main">
   <p:cSld>
     <p:spTree>

</xml_diff>